<commit_message>
full MS draft ready, code is messy but complete
</commit_message>
<xml_diff>
--- a/admin/Experimental-timeline.pptx
+++ b/admin/Experimental-timeline.pptx
@@ -107,6 +107,11 @@
       </a:defRPr>
     </a:lvl9pPr>
   </p:defaultTextStyle>
+  <p:extLst>
+    <p:ext uri="{EFAFB233-063F-42B5-8137-9DF3F51BA10A}">
+      <p15:sldGuideLst xmlns:p15="http://schemas.microsoft.com/office/powerpoint/2012/main"/>
+    </p:ext>
+  </p:extLst>
 </p:presentation>
 </file>
 
@@ -192,7 +197,7 @@
           <a:p>
             <a:fld id="{EF9B3CF0-C897-094E-9E6B-4A580E2A2810}" type="datetimeFigureOut">
               <a:rPr lang="en-US" smtClean="0"/>
-              <a:t>6/10/19</a:t>
+              <a:t>1/14/20</a:t>
             </a:fld>
             <a:endParaRPr lang="en-US"/>
           </a:p>
@@ -674,7 +679,7 @@
           <a:p>
             <a:fld id="{66CEFDD9-C979-C54D-B5C3-854008EE0B6D}" type="datetimeFigureOut">
               <a:rPr lang="en-US" smtClean="0"/>
-              <a:t>6/10/19</a:t>
+              <a:t>1/14/20</a:t>
             </a:fld>
             <a:endParaRPr lang="en-US"/>
           </a:p>
@@ -844,7 +849,7 @@
           <a:p>
             <a:fld id="{66CEFDD9-C979-C54D-B5C3-854008EE0B6D}" type="datetimeFigureOut">
               <a:rPr lang="en-US" smtClean="0"/>
-              <a:t>6/10/19</a:t>
+              <a:t>1/14/20</a:t>
             </a:fld>
             <a:endParaRPr lang="en-US"/>
           </a:p>
@@ -1024,7 +1029,7 @@
           <a:p>
             <a:fld id="{66CEFDD9-C979-C54D-B5C3-854008EE0B6D}" type="datetimeFigureOut">
               <a:rPr lang="en-US" smtClean="0"/>
-              <a:t>6/10/19</a:t>
+              <a:t>1/14/20</a:t>
             </a:fld>
             <a:endParaRPr lang="en-US"/>
           </a:p>
@@ -1194,7 +1199,7 @@
           <a:p>
             <a:fld id="{66CEFDD9-C979-C54D-B5C3-854008EE0B6D}" type="datetimeFigureOut">
               <a:rPr lang="en-US" smtClean="0"/>
-              <a:t>6/10/19</a:t>
+              <a:t>1/14/20</a:t>
             </a:fld>
             <a:endParaRPr lang="en-US"/>
           </a:p>
@@ -1438,7 +1443,7 @@
           <a:p>
             <a:fld id="{66CEFDD9-C979-C54D-B5C3-854008EE0B6D}" type="datetimeFigureOut">
               <a:rPr lang="en-US" smtClean="0"/>
-              <a:t>6/10/19</a:t>
+              <a:t>1/14/20</a:t>
             </a:fld>
             <a:endParaRPr lang="en-US"/>
           </a:p>
@@ -1670,7 +1675,7 @@
           <a:p>
             <a:fld id="{66CEFDD9-C979-C54D-B5C3-854008EE0B6D}" type="datetimeFigureOut">
               <a:rPr lang="en-US" smtClean="0"/>
-              <a:t>6/10/19</a:t>
+              <a:t>1/14/20</a:t>
             </a:fld>
             <a:endParaRPr lang="en-US"/>
           </a:p>
@@ -2037,7 +2042,7 @@
           <a:p>
             <a:fld id="{66CEFDD9-C979-C54D-B5C3-854008EE0B6D}" type="datetimeFigureOut">
               <a:rPr lang="en-US" smtClean="0"/>
-              <a:t>6/10/19</a:t>
+              <a:t>1/14/20</a:t>
             </a:fld>
             <a:endParaRPr lang="en-US"/>
           </a:p>
@@ -2155,7 +2160,7 @@
           <a:p>
             <a:fld id="{66CEFDD9-C979-C54D-B5C3-854008EE0B6D}" type="datetimeFigureOut">
               <a:rPr lang="en-US" smtClean="0"/>
-              <a:t>6/10/19</a:t>
+              <a:t>1/14/20</a:t>
             </a:fld>
             <a:endParaRPr lang="en-US"/>
           </a:p>
@@ -2250,7 +2255,7 @@
           <a:p>
             <a:fld id="{66CEFDD9-C979-C54D-B5C3-854008EE0B6D}" type="datetimeFigureOut">
               <a:rPr lang="en-US" smtClean="0"/>
-              <a:t>6/10/19</a:t>
+              <a:t>1/14/20</a:t>
             </a:fld>
             <a:endParaRPr lang="en-US"/>
           </a:p>
@@ -2527,7 +2532,7 @@
           <a:p>
             <a:fld id="{66CEFDD9-C979-C54D-B5C3-854008EE0B6D}" type="datetimeFigureOut">
               <a:rPr lang="en-US" smtClean="0"/>
-              <a:t>6/10/19</a:t>
+              <a:t>1/14/20</a:t>
             </a:fld>
             <a:endParaRPr lang="en-US"/>
           </a:p>
@@ -2784,7 +2789,7 @@
           <a:p>
             <a:fld id="{66CEFDD9-C979-C54D-B5C3-854008EE0B6D}" type="datetimeFigureOut">
               <a:rPr lang="en-US" smtClean="0"/>
-              <a:t>6/10/19</a:t>
+              <a:t>1/14/20</a:t>
             </a:fld>
             <a:endParaRPr lang="en-US"/>
           </a:p>
@@ -2997,7 +3002,7 @@
           <a:p>
             <a:fld id="{66CEFDD9-C979-C54D-B5C3-854008EE0B6D}" type="datetimeFigureOut">
               <a:rPr lang="en-US" smtClean="0"/>
-              <a:t>6/10/19</a:t>
+              <a:t>1/14/20</a:t>
             </a:fld>
             <a:endParaRPr lang="en-US"/>
           </a:p>
@@ -4416,7 +4421,7 @@
                   <a:latin typeface="Arial" panose="020B0604020202020204" pitchFamily="34" charset="0"/>
                   <a:cs typeface="Arial" panose="020B0604020202020204" pitchFamily="34" charset="0"/>
                 </a:rPr>
-                <a:t>6ºC-High Food, 6ºC-Low Food</a:t>
+                <a:t>7ºC-High Food, 7ºC-Low Food</a:t>
               </a:r>
             </a:p>
             <a:p>
@@ -5733,7 +5738,7 @@
                   <a:latin typeface="Arial" panose="020B0604020202020204" pitchFamily="34" charset="0"/>
                   <a:cs typeface="Arial" panose="020B0604020202020204" pitchFamily="34" charset="0"/>
                 </a:rPr>
-                <a:t>6-week trial, broodstock</a:t>
+                <a:t>6-week exposure, broodstock</a:t>
               </a:r>
             </a:p>
             <a:p>
@@ -5831,7 +5836,7 @@
                   <a:latin typeface="Arial" panose="020B0604020202020204" pitchFamily="34" charset="0"/>
                   <a:cs typeface="Arial" panose="020B0604020202020204" pitchFamily="34" charset="0"/>
                 </a:rPr>
-                <a:t>13-week trial, broodstock</a:t>
+                <a:t>13-week exposure, broodstock</a:t>
               </a:r>
             </a:p>
             <a:p>
@@ -5929,7 +5934,7 @@
                   <a:latin typeface="Arial" panose="020B0604020202020204" pitchFamily="34" charset="0"/>
                   <a:cs typeface="Arial" panose="020B0604020202020204" pitchFamily="34" charset="0"/>
                 </a:rPr>
-                <a:t>13-week trial, larvae</a:t>
+                <a:t>13-week exposure, larvae</a:t>
               </a:r>
             </a:p>
             <a:p>

</xml_diff>